<commit_message>
new version of ppts
</commit_message>
<xml_diff>
--- a/Typescript.pptx
+++ b/Typescript.pptx
@@ -9,11 +9,12 @@
     <p:sldId id="266" r:id="rId3"/>
     <p:sldId id="257" r:id="rId4"/>
     <p:sldId id="259" r:id="rId5"/>
-    <p:sldId id="258" r:id="rId6"/>
+    <p:sldId id="267" r:id="rId6"/>
     <p:sldId id="262" r:id="rId7"/>
     <p:sldId id="264" r:id="rId8"/>
     <p:sldId id="263" r:id="rId9"/>
     <p:sldId id="265" r:id="rId10"/>
+    <p:sldId id="268" r:id="rId11"/>
   </p:sldIdLst>
   <p:sldSz cx="12192000" cy="6858000"/>
   <p:notesSz cx="6858000" cy="9144000"/>
@@ -133,7 +134,7 @@
         </p14:section>
         <p14:section name="Types – Part 1" id="{FC40A588-AE5F-495D-B336-7D287693925D}">
           <p14:sldIdLst>
-            <p14:sldId id="258"/>
+            <p14:sldId id="267"/>
             <p14:sldId id="262"/>
           </p14:sldIdLst>
         </p14:section>
@@ -146,6 +147,7 @@
           <p14:sldIdLst>
             <p14:sldId id="263"/>
             <p14:sldId id="265"/>
+            <p14:sldId id="268"/>
           </p14:sldIdLst>
         </p14:section>
       </p14:sectionLst>
@@ -3900,6 +3902,268 @@
 </p:sld>
 </file>
 
+<file path=ppt/slides/slide10.xml><?xml version="1.0" encoding="utf-8"?>
+<p:sld xmlns:a="http://schemas.openxmlformats.org/drawingml/2006/main" xmlns:r="http://schemas.openxmlformats.org/officeDocument/2006/relationships" xmlns:p="http://schemas.openxmlformats.org/presentationml/2006/main">
+  <p:cSld>
+    <p:spTree>
+      <p:nvGrpSpPr>
+        <p:cNvPr id="1" name=""/>
+        <p:cNvGrpSpPr/>
+        <p:nvPr/>
+      </p:nvGrpSpPr>
+      <p:grpSpPr>
+        <a:xfrm>
+          <a:off x="0" y="0"/>
+          <a:ext cx="0" cy="0"/>
+          <a:chOff x="0" y="0"/>
+          <a:chExt cx="0" cy="0"/>
+        </a:xfrm>
+      </p:grpSpPr>
+      <p:sp>
+        <p:nvSpPr>
+          <p:cNvPr id="2" name="Title 1"/>
+          <p:cNvSpPr>
+            <a:spLocks noGrp="1"/>
+          </p:cNvSpPr>
+          <p:nvPr>
+            <p:ph type="title"/>
+          </p:nvPr>
+        </p:nvSpPr>
+        <p:spPr/>
+        <p:txBody>
+          <a:bodyPr/>
+          <a:lstStyle/>
+          <a:p>
+            <a:r>
+              <a:rPr lang="en-GB" dirty="0"/>
+              <a:t>Truthy &amp; </a:t>
+            </a:r>
+            <a:r>
+              <a:rPr lang="en-GB" dirty="0" err="1"/>
+              <a:t>Falsy</a:t>
+            </a:r>
+            <a:endParaRPr lang="de-DE" dirty="0"/>
+          </a:p>
+        </p:txBody>
+      </p:sp>
+      <p:sp>
+        <p:nvSpPr>
+          <p:cNvPr id="3" name="Content Placeholder 2"/>
+          <p:cNvSpPr>
+            <a:spLocks noGrp="1"/>
+          </p:cNvSpPr>
+          <p:nvPr>
+            <p:ph sz="half" idx="1"/>
+          </p:nvPr>
+        </p:nvSpPr>
+        <p:spPr>
+          <a:xfrm>
+            <a:off x="1371600" y="2285999"/>
+            <a:ext cx="3032620" cy="3581401"/>
+          </a:xfrm>
+        </p:spPr>
+        <p:txBody>
+          <a:bodyPr anchor="ctr"/>
+          <a:lstStyle/>
+          <a:p>
+            <a:r>
+              <a:rPr lang="de-DE" dirty="0"/>
+              <a:t>Non-</a:t>
+            </a:r>
+            <a:r>
+              <a:rPr lang="de-DE" dirty="0" err="1"/>
+              <a:t>booleans</a:t>
+            </a:r>
+            <a:r>
+              <a:rPr lang="de-DE" dirty="0"/>
+              <a:t> </a:t>
+            </a:r>
+            <a:r>
+              <a:rPr lang="de-DE" dirty="0" err="1"/>
+              <a:t>are</a:t>
+            </a:r>
+            <a:r>
+              <a:rPr lang="de-DE" dirty="0"/>
+              <a:t> </a:t>
+            </a:r>
+            <a:r>
+              <a:rPr lang="de-DE" dirty="0" err="1"/>
+              <a:t>interpreted</a:t>
+            </a:r>
+            <a:r>
+              <a:rPr lang="de-DE" dirty="0"/>
+              <a:t> </a:t>
+            </a:r>
+            <a:r>
+              <a:rPr lang="de-DE" dirty="0" err="1"/>
+              <a:t>as</a:t>
+            </a:r>
+            <a:r>
+              <a:rPr lang="de-DE" dirty="0"/>
+              <a:t> </a:t>
+            </a:r>
+            <a:r>
+              <a:rPr lang="de-DE" dirty="0" err="1"/>
+              <a:t>booleans</a:t>
+            </a:r>
+            <a:endParaRPr lang="de-DE" dirty="0"/>
+          </a:p>
+          <a:p>
+            <a:r>
+              <a:rPr lang="de-DE" dirty="0" err="1"/>
+              <a:t>Allow</a:t>
+            </a:r>
+            <a:r>
+              <a:rPr lang="de-DE" dirty="0"/>
+              <a:t> </a:t>
+            </a:r>
+            <a:r>
+              <a:rPr lang="de-DE" dirty="0" err="1"/>
+              <a:t>for</a:t>
+            </a:r>
+            <a:r>
+              <a:rPr lang="de-DE" dirty="0"/>
+              <a:t> simple </a:t>
+            </a:r>
+            <a:r>
+              <a:rPr lang="de-DE" dirty="0" err="1"/>
+              <a:t>undefined</a:t>
+            </a:r>
+            <a:r>
+              <a:rPr lang="de-DE" dirty="0"/>
+              <a:t>/null </a:t>
+            </a:r>
+            <a:r>
+              <a:rPr lang="de-DE" dirty="0" err="1"/>
+              <a:t>checks</a:t>
+            </a:r>
+            <a:endParaRPr lang="de-DE" dirty="0"/>
+          </a:p>
+          <a:p>
+            <a:r>
+              <a:rPr lang="de-DE" dirty="0"/>
+              <a:t>Can </a:t>
+            </a:r>
+            <a:r>
+              <a:rPr lang="de-DE" dirty="0" err="1"/>
+              <a:t>be</a:t>
+            </a:r>
+            <a:r>
+              <a:rPr lang="de-DE" dirty="0"/>
+              <a:t> </a:t>
+            </a:r>
+            <a:r>
+              <a:rPr lang="de-DE" dirty="0" err="1"/>
+              <a:t>converted</a:t>
+            </a:r>
+            <a:r>
+              <a:rPr lang="de-DE" dirty="0"/>
+              <a:t> </a:t>
+            </a:r>
+            <a:r>
+              <a:rPr lang="de-DE" dirty="0" err="1"/>
+              <a:t>to</a:t>
+            </a:r>
+            <a:r>
+              <a:rPr lang="de-DE" dirty="0"/>
+              <a:t> real </a:t>
+            </a:r>
+            <a:r>
+              <a:rPr lang="de-DE" dirty="0" err="1"/>
+              <a:t>booleans</a:t>
+            </a:r>
+            <a:r>
+              <a:rPr lang="de-DE" dirty="0"/>
+              <a:t> </a:t>
+            </a:r>
+            <a:r>
+              <a:rPr lang="de-DE" dirty="0" err="1"/>
+              <a:t>by</a:t>
+            </a:r>
+            <a:r>
+              <a:rPr lang="de-DE" dirty="0"/>
+              <a:t> double </a:t>
+            </a:r>
+            <a:r>
+              <a:rPr lang="de-DE" dirty="0" err="1"/>
+              <a:t>negation</a:t>
+            </a:r>
+            <a:r>
+              <a:rPr lang="de-DE" dirty="0"/>
+              <a:t> (‚!!‘)</a:t>
+            </a:r>
+          </a:p>
+        </p:txBody>
+      </p:sp>
+      <p:sp>
+        <p:nvSpPr>
+          <p:cNvPr id="6" name="TextBox 5"/>
+          <p:cNvSpPr txBox="1"/>
+          <p:nvPr/>
+        </p:nvSpPr>
+        <p:spPr>
+          <a:xfrm>
+            <a:off x="706583" y="5938"/>
+            <a:ext cx="2054431" cy="400110"/>
+          </a:xfrm>
+          <a:prstGeom prst="rect">
+            <a:avLst/>
+          </a:prstGeom>
+          <a:noFill/>
+        </p:spPr>
+        <p:txBody>
+          <a:bodyPr wrap="square" rtlCol="0">
+            <a:spAutoFit/>
+          </a:bodyPr>
+          <a:lstStyle/>
+          <a:p>
+            <a:r>
+              <a:rPr lang="en-GB" sz="2000" dirty="0"/>
+              <a:t>Basics</a:t>
+            </a:r>
+            <a:endParaRPr lang="de-DE" dirty="0"/>
+          </a:p>
+        </p:txBody>
+      </p:sp>
+      <p:pic>
+        <p:nvPicPr>
+          <p:cNvPr id="10" name="Content Placeholder 9"/>
+          <p:cNvPicPr>
+            <a:picLocks noGrp="1" noChangeAspect="1"/>
+          </p:cNvPicPr>
+          <p:nvPr>
+            <p:ph sz="half" idx="2"/>
+          </p:nvPr>
+        </p:nvPicPr>
+        <p:blipFill>
+          <a:blip r:embed="rId2"/>
+          <a:stretch>
+            <a:fillRect/>
+          </a:stretch>
+        </p:blipFill>
+        <p:spPr>
+          <a:xfrm>
+            <a:off x="4513458" y="2617366"/>
+            <a:ext cx="7598054" cy="2918666"/>
+          </a:xfrm>
+          <a:prstGeom prst="rect">
+            <a:avLst/>
+          </a:prstGeom>
+        </p:spPr>
+      </p:pic>
+    </p:spTree>
+    <p:extLst>
+      <p:ext uri="{BB962C8B-B14F-4D97-AF65-F5344CB8AC3E}">
+        <p14:creationId xmlns:p14="http://schemas.microsoft.com/office/powerpoint/2010/main" val="1600216017"/>
+      </p:ext>
+    </p:extLst>
+  </p:cSld>
+  <p:clrMapOvr>
+    <a:masterClrMapping/>
+  </p:clrMapOvr>
+</p:sld>
+</file>
+
 <file path=ppt/slides/slide2.xml><?xml version="1.0" encoding="utf-8"?>
 <p:sld xmlns:a="http://schemas.openxmlformats.org/drawingml/2006/main" xmlns:r="http://schemas.openxmlformats.org/officeDocument/2006/relationships" xmlns:p="http://schemas.openxmlformats.org/presentationml/2006/main">
   <p:cSld>
@@ -4084,7 +4348,7 @@
             </p:grpSpPr>
             <p:pic>
               <p:nvPicPr>
-                <p:cNvPr id="6" name="Picture 6">
+                <p:cNvPr id="3" name="Picture 3">
                   <a:hlinkClick r:id="rId6" action="ppaction://hlinksldjump"/>
                 </p:cNvPr>
                 <p:cNvPicPr>
@@ -4115,7 +4379,7 @@
             </p:pic>
             <p:pic>
               <p:nvPicPr>
-                <p:cNvPr id="7" name="Picture 7">
+                <p:cNvPr id="4" name="Picture 4">
                   <a:hlinkClick r:id="rId7" action="ppaction://hlinksldjump"/>
                 </p:cNvPr>
                 <p:cNvPicPr>
@@ -4146,7 +4410,7 @@
             </p:pic>
             <p:pic>
               <p:nvPicPr>
-                <p:cNvPr id="8" name="Picture 8">
+                <p:cNvPr id="6" name="Picture 6">
                   <a:hlinkClick r:id="rId8" action="ppaction://hlinksldjump"/>
                 </p:cNvPr>
                 <p:cNvPicPr>
@@ -4177,7 +4441,7 @@
             </p:pic>
             <p:pic>
               <p:nvPicPr>
-                <p:cNvPr id="9" name="Picture 9">
+                <p:cNvPr id="7" name="Picture 7">
                   <a:hlinkClick r:id="rId9" action="ppaction://hlinksldjump"/>
                 </p:cNvPr>
                 <p:cNvPicPr>
@@ -4302,11 +4566,13 @@
       </p:sp>
       <p:pic>
         <p:nvPicPr>
-          <p:cNvPr id="10" name="Picture 9"/>
+          <p:cNvPr id="7" name="Content Placeholder 6"/>
           <p:cNvPicPr>
-            <a:picLocks noChangeAspect="1"/>
+            <a:picLocks noGrp="1" noChangeAspect="1"/>
           </p:cNvPicPr>
-          <p:nvPr/>
+          <p:nvPr>
+            <p:ph idx="1"/>
+          </p:nvPr>
         </p:nvPicPr>
         <p:blipFill>
           <a:blip r:embed="rId2"/>
@@ -4316,8 +4582,8 @@
         </p:blipFill>
         <p:spPr>
           <a:xfrm>
-            <a:off x="1371600" y="2707548"/>
-            <a:ext cx="9180722" cy="1897823"/>
+            <a:off x="1747220" y="3276488"/>
+            <a:ext cx="8849960" cy="1600423"/>
           </a:xfrm>
           <a:prstGeom prst="rect">
             <a:avLst/>
@@ -4696,7 +4962,7 @@
       </p:sp>
       <p:pic>
         <p:nvPicPr>
-          <p:cNvPr id="12" name="Content Placeholder 11"/>
+          <p:cNvPr id="6" name="Content Placeholder 5"/>
           <p:cNvPicPr>
             <a:picLocks noGrp="1" noChangeAspect="1"/>
           </p:cNvPicPr>
@@ -4712,8 +4978,8 @@
         </p:blipFill>
         <p:spPr>
           <a:xfrm>
-            <a:off x="6216732" y="2559444"/>
-            <a:ext cx="5063960" cy="3034512"/>
+            <a:off x="6148725" y="2558642"/>
+            <a:ext cx="5199976" cy="3036116"/>
           </a:xfrm>
           <a:prstGeom prst="rect">
             <a:avLst/>
@@ -4723,7 +4989,7 @@
     </p:spTree>
     <p:extLst>
       <p:ext uri="{BB962C8B-B14F-4D97-AF65-F5344CB8AC3E}">
-        <p14:creationId xmlns:p14="http://schemas.microsoft.com/office/powerpoint/2010/main" val="3842926407"/>
+        <p14:creationId xmlns:p14="http://schemas.microsoft.com/office/powerpoint/2010/main" val="1525262803"/>
       </p:ext>
     </p:extLst>
   </p:cSld>
@@ -4856,7 +5122,7 @@
       </p:sp>
       <p:pic>
         <p:nvPicPr>
-          <p:cNvPr id="6" name="Content Placeholder 5"/>
+          <p:cNvPr id="9" name="Content Placeholder 8"/>
           <p:cNvPicPr>
             <a:picLocks noGrp="1" noChangeAspect="1"/>
           </p:cNvPicPr>
@@ -4872,8 +5138,8 @@
         </p:blipFill>
         <p:spPr>
           <a:xfrm>
-            <a:off x="6182686" y="1625355"/>
-            <a:ext cx="5132052" cy="4902690"/>
+            <a:off x="5905483" y="1468073"/>
+            <a:ext cx="5686458" cy="5217254"/>
           </a:xfrm>
           <a:prstGeom prst="rect">
             <a:avLst/>
@@ -4973,9 +5239,39 @@
           </a:p>
         </p:txBody>
       </p:sp>
+      <p:sp>
+        <p:nvSpPr>
+          <p:cNvPr id="6" name="TextBox 5"/>
+          <p:cNvSpPr txBox="1"/>
+          <p:nvPr/>
+        </p:nvSpPr>
+        <p:spPr>
+          <a:xfrm>
+            <a:off x="706583" y="5938"/>
+            <a:ext cx="2054431" cy="400110"/>
+          </a:xfrm>
+          <a:prstGeom prst="rect">
+            <a:avLst/>
+          </a:prstGeom>
+          <a:noFill/>
+        </p:spPr>
+        <p:txBody>
+          <a:bodyPr wrap="square" rtlCol="0">
+            <a:spAutoFit/>
+          </a:bodyPr>
+          <a:lstStyle/>
+          <a:p>
+            <a:r>
+              <a:rPr lang="en-GB" sz="2000" dirty="0"/>
+              <a:t>Basics</a:t>
+            </a:r>
+            <a:endParaRPr lang="de-DE" dirty="0"/>
+          </a:p>
+        </p:txBody>
+      </p:sp>
       <p:pic>
         <p:nvPicPr>
-          <p:cNvPr id="5" name="Content Placeholder 4"/>
+          <p:cNvPr id="7" name="Content Placeholder 6"/>
           <p:cNvPicPr>
             <a:picLocks noGrp="1" noChangeAspect="1"/>
           </p:cNvPicPr>
@@ -4991,44 +5287,14 @@
         </p:blipFill>
         <p:spPr>
           <a:xfrm>
-            <a:off x="4962715" y="3129093"/>
-            <a:ext cx="6984766" cy="1895212"/>
+            <a:off x="4806892" y="3344464"/>
+            <a:ext cx="7078298" cy="1464472"/>
           </a:xfrm>
           <a:prstGeom prst="rect">
             <a:avLst/>
           </a:prstGeom>
         </p:spPr>
       </p:pic>
-      <p:sp>
-        <p:nvSpPr>
-          <p:cNvPr id="6" name="TextBox 5"/>
-          <p:cNvSpPr txBox="1"/>
-          <p:nvPr/>
-        </p:nvSpPr>
-        <p:spPr>
-          <a:xfrm>
-            <a:off x="706583" y="5938"/>
-            <a:ext cx="2054431" cy="400110"/>
-          </a:xfrm>
-          <a:prstGeom prst="rect">
-            <a:avLst/>
-          </a:prstGeom>
-          <a:noFill/>
-        </p:spPr>
-        <p:txBody>
-          <a:bodyPr wrap="square" rtlCol="0">
-            <a:spAutoFit/>
-          </a:bodyPr>
-          <a:lstStyle/>
-          <a:p>
-            <a:r>
-              <a:rPr lang="en-GB" sz="2000" dirty="0"/>
-              <a:t>Basics</a:t>
-            </a:r>
-            <a:endParaRPr lang="de-DE" dirty="0"/>
-          </a:p>
-        </p:txBody>
-      </p:sp>
     </p:spTree>
     <p:extLst>
       <p:ext uri="{BB962C8B-B14F-4D97-AF65-F5344CB8AC3E}">
@@ -5092,7 +5358,12 @@
             <p:ph sz="half" idx="1"/>
           </p:nvPr>
         </p:nvSpPr>
-        <p:spPr/>
+        <p:spPr>
+          <a:xfrm>
+            <a:off x="1371600" y="2285999"/>
+            <a:ext cx="2982286" cy="3581401"/>
+          </a:xfrm>
+        </p:spPr>
         <p:txBody>
           <a:bodyPr anchor="ctr"/>
           <a:lstStyle/>
@@ -5117,9 +5388,39 @@
           </a:p>
         </p:txBody>
       </p:sp>
+      <p:sp>
+        <p:nvSpPr>
+          <p:cNvPr id="6" name="TextBox 5"/>
+          <p:cNvSpPr txBox="1"/>
+          <p:nvPr/>
+        </p:nvSpPr>
+        <p:spPr>
+          <a:xfrm>
+            <a:off x="706583" y="5938"/>
+            <a:ext cx="2054431" cy="400110"/>
+          </a:xfrm>
+          <a:prstGeom prst="rect">
+            <a:avLst/>
+          </a:prstGeom>
+          <a:noFill/>
+        </p:spPr>
+        <p:txBody>
+          <a:bodyPr wrap="square" rtlCol="0">
+            <a:spAutoFit/>
+          </a:bodyPr>
+          <a:lstStyle/>
+          <a:p>
+            <a:r>
+              <a:rPr lang="en-GB" sz="2000" dirty="0"/>
+              <a:t>Basics</a:t>
+            </a:r>
+            <a:endParaRPr lang="de-DE" dirty="0"/>
+          </a:p>
+        </p:txBody>
+      </p:sp>
       <p:pic>
         <p:nvPicPr>
-          <p:cNvPr id="5" name="Content Placeholder 4"/>
+          <p:cNvPr id="7" name="Content Placeholder 6"/>
           <p:cNvPicPr>
             <a:picLocks noGrp="1" noChangeAspect="1"/>
           </p:cNvPicPr>
@@ -5135,44 +5436,14 @@
         </p:blipFill>
         <p:spPr>
           <a:xfrm>
-            <a:off x="5369437" y="1879134"/>
-            <a:ext cx="6758552" cy="4395132"/>
+            <a:off x="4798503" y="2417084"/>
+            <a:ext cx="7413858" cy="3319232"/>
           </a:xfrm>
           <a:prstGeom prst="rect">
             <a:avLst/>
           </a:prstGeom>
         </p:spPr>
       </p:pic>
-      <p:sp>
-        <p:nvSpPr>
-          <p:cNvPr id="6" name="TextBox 5"/>
-          <p:cNvSpPr txBox="1"/>
-          <p:nvPr/>
-        </p:nvSpPr>
-        <p:spPr>
-          <a:xfrm>
-            <a:off x="706583" y="5938"/>
-            <a:ext cx="2054431" cy="400110"/>
-          </a:xfrm>
-          <a:prstGeom prst="rect">
-            <a:avLst/>
-          </a:prstGeom>
-          <a:noFill/>
-        </p:spPr>
-        <p:txBody>
-          <a:bodyPr wrap="square" rtlCol="0">
-            <a:spAutoFit/>
-          </a:bodyPr>
-          <a:lstStyle/>
-          <a:p>
-            <a:r>
-              <a:rPr lang="en-GB" sz="2000" dirty="0"/>
-              <a:t>Basics</a:t>
-            </a:r>
-            <a:endParaRPr lang="de-DE" dirty="0"/>
-          </a:p>
-        </p:txBody>
-      </p:sp>
     </p:spTree>
     <p:extLst>
       <p:ext uri="{BB962C8B-B14F-4D97-AF65-F5344CB8AC3E}">
@@ -5298,7 +5569,7 @@
       </p:sp>
       <p:pic>
         <p:nvPicPr>
-          <p:cNvPr id="7" name="Content Placeholder 6"/>
+          <p:cNvPr id="5" name="Content Placeholder 4"/>
           <p:cNvPicPr>
             <a:picLocks noGrp="1" noChangeAspect="1"/>
           </p:cNvPicPr>
@@ -5314,8 +5585,8 @@
         </p:blipFill>
         <p:spPr>
           <a:xfrm>
-            <a:off x="4429387" y="3167641"/>
-            <a:ext cx="7601446" cy="1818116"/>
+            <a:off x="4504386" y="3246540"/>
+            <a:ext cx="7632976" cy="1660320"/>
           </a:xfrm>
           <a:prstGeom prst="rect">
             <a:avLst/>

</xml_diff>